<commit_message>
final commit of code and ppt file
</commit_message>
<xml_diff>
--- a/Stock Analysis.pptx
+++ b/Stock Analysis.pptx
@@ -5223,7 +5223,7 @@
                 <a:latin typeface="Times New Roman" panose="02020603050405020304" pitchFamily="18" charset="0"/>
                 <a:cs typeface="Times New Roman" panose="02020603050405020304" pitchFamily="18" charset="0"/>
               </a:rPr>
-              <a:t>From the analysis graph its seen that stock for JNJ for past 5 years</a:t>
+              <a:t>From the analysis graph its seen that stock for Dell for past 5 years</a:t>
             </a:r>
           </a:p>
           <a:p>
@@ -5251,14 +5251,20 @@
                 <a:latin typeface="Times New Roman" panose="02020603050405020304" pitchFamily="18" charset="0"/>
                 <a:cs typeface="Times New Roman" panose="02020603050405020304" pitchFamily="18" charset="0"/>
               </a:rPr>
-              <a:t>It can be predicted that the value will be decreasing for the upcoming days and hence its recommended not purchase the JNJ stock.</a:t>
+              <a:t>It can be predicted that the value will be decreasing for the upcoming days and hence its recommended not purchase the Dell stock.</a:t>
             </a:r>
           </a:p>
         </p:txBody>
       </p:sp>
       <p:pic>
         <p:nvPicPr>
-          <p:cNvPr id="7" name="Content Placeholder 6" descr="Chart&#10;&#10;Description automatically generated"/>
+          <p:cNvPr id="8" name="Content Placeholder 7" descr="Chart, line chart&#10;&#10;Description automatically generated">
+            <a:extLst>
+              <a:ext uri="{FF2B5EF4-FFF2-40B4-BE49-F238E27FC236}">
+                <a16:creationId xmlns:a16="http://schemas.microsoft.com/office/drawing/2014/main" id="{1264442A-4179-43B7-BBCA-3C6841A8BB93}"/>
+              </a:ext>
+            </a:extLst>
+          </p:cNvPr>
           <p:cNvPicPr>
             <a:picLocks noGrp="1" noChangeAspect="1"/>
           </p:cNvPicPr>
@@ -5280,14 +5286,51 @@
         </p:blipFill>
         <p:spPr>
           <a:xfrm>
-            <a:off x="6438265" y="2371725"/>
-            <a:ext cx="4902200" cy="3530600"/>
+            <a:off x="6594154" y="2685054"/>
+            <a:ext cx="4591691" cy="2905530"/>
+          </a:xfrm>
+        </p:spPr>
+      </p:pic>
+      <p:sp>
+        <p:nvSpPr>
+          <p:cNvPr id="9" name="TextBox 8">
+            <a:extLst>
+              <a:ext uri="{FF2B5EF4-FFF2-40B4-BE49-F238E27FC236}">
+                <a16:creationId xmlns:a16="http://schemas.microsoft.com/office/drawing/2014/main" id="{508B3A55-F0E5-4D38-BDA4-908FC3E30740}"/>
+              </a:ext>
+            </a:extLst>
+          </p:cNvPr>
+          <p:cNvSpPr txBox="1"/>
+          <p:nvPr/>
+        </p:nvSpPr>
+        <p:spPr>
+          <a:xfrm>
+            <a:off x="8834511" y="5866228"/>
+            <a:ext cx="663964" cy="369332"/>
           </a:xfrm>
           <a:prstGeom prst="rect">
             <a:avLst/>
           </a:prstGeom>
+          <a:noFill/>
+          <a:ln>
+            <a:solidFill>
+              <a:schemeClr val="bg2"/>
+            </a:solidFill>
+          </a:ln>
         </p:spPr>
-      </p:pic>
+        <p:txBody>
+          <a:bodyPr wrap="none" rtlCol="0">
+            <a:spAutoFit/>
+          </a:bodyPr>
+          <a:lstStyle/>
+          <a:p>
+            <a:r>
+              <a:rPr lang="en-US" dirty="0"/>
+              <a:t>Date</a:t>
+            </a:r>
+          </a:p>
+        </p:txBody>
+      </p:sp>
     </p:spTree>
   </p:cSld>
   <p:clrMapOvr>

</xml_diff>